<commit_message>
Projektmappe und Präsentation aktualisiert
</commit_message>
<xml_diff>
--- a/Dokumentation/SEP Gruppe L - Swat Engagement Pheretima.pptx
+++ b/Dokumentation/SEP Gruppe L - Swat Engagement Pheretima.pptx
@@ -309,7 +309,7 @@
           <a:p>
             <a:fld id="{4AAD347D-5ACD-4C99-B74B-A9C85AD731AF}" type="datetimeFigureOut">
               <a:rPr lang="en-US" dirty="0"/>
-              <a:t>5/10/2018</a:t>
+              <a:t>5/13/2018</a:t>
             </a:fld>
             <a:endParaRPr lang="en-US" dirty="0"/>
           </a:p>
@@ -579,7 +579,7 @@
           <a:p>
             <a:fld id="{4509A250-FF31-4206-8172-F9D3106AACB1}" type="datetimeFigureOut">
               <a:rPr lang="en-US" dirty="0"/>
-              <a:t>5/10/2018</a:t>
+              <a:t>5/13/2018</a:t>
             </a:fld>
             <a:endParaRPr lang="en-US" dirty="0"/>
           </a:p>
@@ -768,7 +768,7 @@
           <a:p>
             <a:fld id="{4509A250-FF31-4206-8172-F9D3106AACB1}" type="datetimeFigureOut">
               <a:rPr lang="en-US" dirty="0"/>
-              <a:t>5/10/2018</a:t>
+              <a:t>5/13/2018</a:t>
             </a:fld>
             <a:endParaRPr lang="en-US" dirty="0"/>
           </a:p>
@@ -1036,7 +1036,7 @@
           <a:p>
             <a:fld id="{4509A250-FF31-4206-8172-F9D3106AACB1}" type="datetimeFigureOut">
               <a:rPr lang="en-US" dirty="0"/>
-              <a:t>5/10/2018</a:t>
+              <a:t>5/13/2018</a:t>
             </a:fld>
             <a:endParaRPr lang="en-US" dirty="0"/>
           </a:p>
@@ -1372,7 +1372,7 @@
           <a:p>
             <a:fld id="{4509A250-FF31-4206-8172-F9D3106AACB1}" type="datetimeFigureOut">
               <a:rPr lang="en-US" dirty="0"/>
-              <a:t>5/10/2018</a:t>
+              <a:t>5/13/2018</a:t>
             </a:fld>
             <a:endParaRPr lang="en-US" dirty="0"/>
           </a:p>
@@ -1990,7 +1990,7 @@
           <a:p>
             <a:fld id="{4509A250-FF31-4206-8172-F9D3106AACB1}" type="datetimeFigureOut">
               <a:rPr lang="en-US" dirty="0"/>
-              <a:t>5/10/2018</a:t>
+              <a:t>5/13/2018</a:t>
             </a:fld>
             <a:endParaRPr lang="en-US" dirty="0"/>
           </a:p>
@@ -2845,7 +2845,7 @@
           <a:p>
             <a:fld id="{4509A250-FF31-4206-8172-F9D3106AACB1}" type="datetimeFigureOut">
               <a:rPr lang="en-US" dirty="0"/>
-              <a:t>5/10/2018</a:t>
+              <a:t>5/13/2018</a:t>
             </a:fld>
             <a:endParaRPr lang="en-US" dirty="0"/>
           </a:p>
@@ -3010,7 +3010,7 @@
           <a:p>
             <a:fld id="{4509A250-FF31-4206-8172-F9D3106AACB1}" type="datetimeFigureOut">
               <a:rPr lang="en-US" dirty="0"/>
-              <a:t>5/10/2018</a:t>
+              <a:t>5/13/2018</a:t>
             </a:fld>
             <a:endParaRPr lang="en-US" dirty="0"/>
           </a:p>
@@ -3185,7 +3185,7 @@
           <a:p>
             <a:fld id="{4509A250-FF31-4206-8172-F9D3106AACB1}" type="datetimeFigureOut">
               <a:rPr lang="en-US" dirty="0"/>
-              <a:t>5/10/2018</a:t>
+              <a:t>5/13/2018</a:t>
             </a:fld>
             <a:endParaRPr lang="en-US" dirty="0"/>
           </a:p>
@@ -3350,7 +3350,7 @@
           <a:p>
             <a:fld id="{4509A250-FF31-4206-8172-F9D3106AACB1}" type="datetimeFigureOut">
               <a:rPr lang="en-US" dirty="0"/>
-              <a:t>5/10/2018</a:t>
+              <a:t>5/13/2018</a:t>
             </a:fld>
             <a:endParaRPr lang="en-US" dirty="0"/>
           </a:p>
@@ -3592,7 +3592,7 @@
           <a:p>
             <a:fld id="{9796027F-7875-4030-9381-8BD8C4F21935}" type="datetimeFigureOut">
               <a:rPr lang="en-US" dirty="0"/>
-              <a:t>5/10/2018</a:t>
+              <a:t>5/13/2018</a:t>
             </a:fld>
             <a:endParaRPr lang="en-US" dirty="0"/>
           </a:p>
@@ -3879,7 +3879,7 @@
           <a:p>
             <a:fld id="{9796027F-7875-4030-9381-8BD8C4F21935}" type="datetimeFigureOut">
               <a:rPr lang="en-US" dirty="0"/>
-              <a:t>5/10/2018</a:t>
+              <a:t>5/13/2018</a:t>
             </a:fld>
             <a:endParaRPr lang="en-US" dirty="0"/>
           </a:p>
@@ -4318,7 +4318,7 @@
           <a:p>
             <a:fld id="{9796027F-7875-4030-9381-8BD8C4F21935}" type="datetimeFigureOut">
               <a:rPr lang="en-US" dirty="0"/>
-              <a:t>5/10/2018</a:t>
+              <a:t>5/13/2018</a:t>
             </a:fld>
             <a:endParaRPr lang="en-US" dirty="0"/>
           </a:p>
@@ -4431,7 +4431,7 @@
           <a:p>
             <a:fld id="{4509A250-FF31-4206-8172-F9D3106AACB1}" type="datetimeFigureOut">
               <a:rPr lang="en-US" dirty="0"/>
-              <a:t>5/10/2018</a:t>
+              <a:t>5/13/2018</a:t>
             </a:fld>
             <a:endParaRPr lang="en-US" dirty="0"/>
           </a:p>
@@ -4521,7 +4521,7 @@
           <a:p>
             <a:fld id="{4509A250-FF31-4206-8172-F9D3106AACB1}" type="datetimeFigureOut">
               <a:rPr lang="en-US" dirty="0"/>
-              <a:t>5/10/2018</a:t>
+              <a:t>5/13/2018</a:t>
             </a:fld>
             <a:endParaRPr lang="en-US" dirty="0"/>
           </a:p>
@@ -4795,7 +4795,7 @@
           <a:p>
             <a:fld id="{4509A250-FF31-4206-8172-F9D3106AACB1}" type="datetimeFigureOut">
               <a:rPr lang="en-US" dirty="0"/>
-              <a:t>5/10/2018</a:t>
+              <a:t>5/13/2018</a:t>
             </a:fld>
             <a:endParaRPr lang="en-US" dirty="0"/>
           </a:p>
@@ -5065,7 +5065,7 @@
           <a:p>
             <a:fld id="{4509A250-FF31-4206-8172-F9D3106AACB1}" type="datetimeFigureOut">
               <a:rPr lang="en-US" dirty="0"/>
-              <a:t>5/10/2018</a:t>
+              <a:t>5/13/2018</a:t>
             </a:fld>
             <a:endParaRPr lang="en-US" dirty="0"/>
           </a:p>
@@ -5489,7 +5489,7 @@
           <a:p>
             <a:fld id="{4AAD347D-5ACD-4C99-B74B-A9C85AD731AF}" type="datetimeFigureOut">
               <a:rPr lang="en-US" dirty="0"/>
-              <a:t>5/10/2018</a:t>
+              <a:t>5/13/2018</a:t>
             </a:fld>
             <a:endParaRPr lang="en-US" dirty="0"/>
           </a:p>
@@ -8108,7 +8108,7 @@
             <p:ph idx="1"/>
             <p:extLst>
               <p:ext uri="{D42A27DB-BD31-4B8C-83A1-F6EECF244321}">
-                <p14:modId xmlns:p14="http://schemas.microsoft.com/office/powerpoint/2010/main" val="916022742"/>
+                <p14:modId xmlns:p14="http://schemas.microsoft.com/office/powerpoint/2010/main" val="1453721343"/>
               </p:ext>
             </p:extLst>
           </p:nvPr>
@@ -8600,7 +8600,7 @@
                         <a:rPr lang="de-DE" sz="1100" dirty="0">
                           <a:effectLst/>
                         </a:rPr>
-                        <a:t>1. Spieler wählt angreifen</a:t>
+                        <a:t>1. Spieler kann angreifen</a:t>
                       </a:r>
                     </a:p>
                     <a:p>
@@ -8706,7 +8706,7 @@
                         <a:rPr lang="de-DE" sz="1100" dirty="0">
                           <a:effectLst/>
                         </a:rPr>
-                        <a:t>1. Spieler wählt angreifen</a:t>
+                        <a:t>1. Spieler kann angreifen</a:t>
                       </a:r>
                     </a:p>
                     <a:p>
@@ -9611,35 +9611,6 @@
           </a:p>
         </p:txBody>
       </p:sp>
-      <p:pic>
-        <p:nvPicPr>
-          <p:cNvPr id="7" name="Inhaltsplatzhalter 6">
-            <a:extLst>
-              <a:ext uri="{FF2B5EF4-FFF2-40B4-BE49-F238E27FC236}">
-                <a16:creationId xmlns:a16="http://schemas.microsoft.com/office/drawing/2014/main" id="{A074AEC7-CE3B-4C71-BDF5-A02E9802BE4E}"/>
-              </a:ext>
-            </a:extLst>
-          </p:cNvPr>
-          <p:cNvPicPr>
-            <a:picLocks noGrp="1" noChangeAspect="1"/>
-          </p:cNvPicPr>
-          <p:nvPr>
-            <p:ph idx="1"/>
-          </p:nvPr>
-        </p:nvPicPr>
-        <p:blipFill>
-          <a:blip r:embed="rId2"/>
-          <a:stretch>
-            <a:fillRect/>
-          </a:stretch>
-        </p:blipFill>
-        <p:spPr>
-          <a:xfrm>
-            <a:off x="3841404" y="1387722"/>
-            <a:ext cx="4150803" cy="5017560"/>
-          </a:xfrm>
-        </p:spPr>
-      </p:pic>
       <p:sp>
         <p:nvSpPr>
           <p:cNvPr id="8" name="Textfeld 7">
@@ -9675,6 +9646,35 @@
           </a:p>
         </p:txBody>
       </p:sp>
+      <p:pic>
+        <p:nvPicPr>
+          <p:cNvPr id="16" name="Inhaltsplatzhalter 15">
+            <a:extLst>
+              <a:ext uri="{FF2B5EF4-FFF2-40B4-BE49-F238E27FC236}">
+                <a16:creationId xmlns:a16="http://schemas.microsoft.com/office/drawing/2014/main" id="{96825A31-5EEE-4A5C-BFBE-3D62F778DF50}"/>
+              </a:ext>
+            </a:extLst>
+          </p:cNvPr>
+          <p:cNvPicPr>
+            <a:picLocks noGrp="1" noChangeAspect="1"/>
+          </p:cNvPicPr>
+          <p:nvPr>
+            <p:ph idx="1"/>
+          </p:nvPr>
+        </p:nvPicPr>
+        <p:blipFill>
+          <a:blip r:embed="rId2"/>
+          <a:stretch>
+            <a:fillRect/>
+          </a:stretch>
+        </p:blipFill>
+        <p:spPr>
+          <a:xfrm>
+            <a:off x="3749879" y="1536822"/>
+            <a:ext cx="4387397" cy="4644975"/>
+          </a:xfrm>
+        </p:spPr>
+      </p:pic>
     </p:spTree>
     <p:extLst>
       <p:ext uri="{BB962C8B-B14F-4D97-AF65-F5344CB8AC3E}">

</xml_diff>

<commit_message>
Aufräumen der Klasse CollisionHandler, Fehlerhaftes Bild (Spiel Vorstellung) ersetzt
</commit_message>
<xml_diff>
--- a/Dokumentation/SEP Gruppe L - Swat Engagement Pheretima.pptx
+++ b/Dokumentation/SEP Gruppe L - Swat Engagement Pheretima.pptx
@@ -309,7 +309,7 @@
           <a:p>
             <a:fld id="{4AAD347D-5ACD-4C99-B74B-A9C85AD731AF}" type="datetimeFigureOut">
               <a:rPr lang="en-US" dirty="0"/>
-              <a:t>5/10/2018</a:t>
+              <a:t>5/13/2018</a:t>
             </a:fld>
             <a:endParaRPr lang="en-US" dirty="0"/>
           </a:p>
@@ -579,7 +579,7 @@
           <a:p>
             <a:fld id="{4509A250-FF31-4206-8172-F9D3106AACB1}" type="datetimeFigureOut">
               <a:rPr lang="en-US" dirty="0"/>
-              <a:t>5/10/2018</a:t>
+              <a:t>5/13/2018</a:t>
             </a:fld>
             <a:endParaRPr lang="en-US" dirty="0"/>
           </a:p>
@@ -768,7 +768,7 @@
           <a:p>
             <a:fld id="{4509A250-FF31-4206-8172-F9D3106AACB1}" type="datetimeFigureOut">
               <a:rPr lang="en-US" dirty="0"/>
-              <a:t>5/10/2018</a:t>
+              <a:t>5/13/2018</a:t>
             </a:fld>
             <a:endParaRPr lang="en-US" dirty="0"/>
           </a:p>
@@ -1036,7 +1036,7 @@
           <a:p>
             <a:fld id="{4509A250-FF31-4206-8172-F9D3106AACB1}" type="datetimeFigureOut">
               <a:rPr lang="en-US" dirty="0"/>
-              <a:t>5/10/2018</a:t>
+              <a:t>5/13/2018</a:t>
             </a:fld>
             <a:endParaRPr lang="en-US" dirty="0"/>
           </a:p>
@@ -1372,7 +1372,7 @@
           <a:p>
             <a:fld id="{4509A250-FF31-4206-8172-F9D3106AACB1}" type="datetimeFigureOut">
               <a:rPr lang="en-US" dirty="0"/>
-              <a:t>5/10/2018</a:t>
+              <a:t>5/13/2018</a:t>
             </a:fld>
             <a:endParaRPr lang="en-US" dirty="0"/>
           </a:p>
@@ -1990,7 +1990,7 @@
           <a:p>
             <a:fld id="{4509A250-FF31-4206-8172-F9D3106AACB1}" type="datetimeFigureOut">
               <a:rPr lang="en-US" dirty="0"/>
-              <a:t>5/10/2018</a:t>
+              <a:t>5/13/2018</a:t>
             </a:fld>
             <a:endParaRPr lang="en-US" dirty="0"/>
           </a:p>
@@ -2845,7 +2845,7 @@
           <a:p>
             <a:fld id="{4509A250-FF31-4206-8172-F9D3106AACB1}" type="datetimeFigureOut">
               <a:rPr lang="en-US" dirty="0"/>
-              <a:t>5/10/2018</a:t>
+              <a:t>5/13/2018</a:t>
             </a:fld>
             <a:endParaRPr lang="en-US" dirty="0"/>
           </a:p>
@@ -3010,7 +3010,7 @@
           <a:p>
             <a:fld id="{4509A250-FF31-4206-8172-F9D3106AACB1}" type="datetimeFigureOut">
               <a:rPr lang="en-US" dirty="0"/>
-              <a:t>5/10/2018</a:t>
+              <a:t>5/13/2018</a:t>
             </a:fld>
             <a:endParaRPr lang="en-US" dirty="0"/>
           </a:p>
@@ -3185,7 +3185,7 @@
           <a:p>
             <a:fld id="{4509A250-FF31-4206-8172-F9D3106AACB1}" type="datetimeFigureOut">
               <a:rPr lang="en-US" dirty="0"/>
-              <a:t>5/10/2018</a:t>
+              <a:t>5/13/2018</a:t>
             </a:fld>
             <a:endParaRPr lang="en-US" dirty="0"/>
           </a:p>
@@ -3350,7 +3350,7 @@
           <a:p>
             <a:fld id="{4509A250-FF31-4206-8172-F9D3106AACB1}" type="datetimeFigureOut">
               <a:rPr lang="en-US" dirty="0"/>
-              <a:t>5/10/2018</a:t>
+              <a:t>5/13/2018</a:t>
             </a:fld>
             <a:endParaRPr lang="en-US" dirty="0"/>
           </a:p>
@@ -3592,7 +3592,7 @@
           <a:p>
             <a:fld id="{9796027F-7875-4030-9381-8BD8C4F21935}" type="datetimeFigureOut">
               <a:rPr lang="en-US" dirty="0"/>
-              <a:t>5/10/2018</a:t>
+              <a:t>5/13/2018</a:t>
             </a:fld>
             <a:endParaRPr lang="en-US" dirty="0"/>
           </a:p>
@@ -3879,7 +3879,7 @@
           <a:p>
             <a:fld id="{9796027F-7875-4030-9381-8BD8C4F21935}" type="datetimeFigureOut">
               <a:rPr lang="en-US" dirty="0"/>
-              <a:t>5/10/2018</a:t>
+              <a:t>5/13/2018</a:t>
             </a:fld>
             <a:endParaRPr lang="en-US" dirty="0"/>
           </a:p>
@@ -4318,7 +4318,7 @@
           <a:p>
             <a:fld id="{9796027F-7875-4030-9381-8BD8C4F21935}" type="datetimeFigureOut">
               <a:rPr lang="en-US" dirty="0"/>
-              <a:t>5/10/2018</a:t>
+              <a:t>5/13/2018</a:t>
             </a:fld>
             <a:endParaRPr lang="en-US" dirty="0"/>
           </a:p>
@@ -4431,7 +4431,7 @@
           <a:p>
             <a:fld id="{4509A250-FF31-4206-8172-F9D3106AACB1}" type="datetimeFigureOut">
               <a:rPr lang="en-US" dirty="0"/>
-              <a:t>5/10/2018</a:t>
+              <a:t>5/13/2018</a:t>
             </a:fld>
             <a:endParaRPr lang="en-US" dirty="0"/>
           </a:p>
@@ -4521,7 +4521,7 @@
           <a:p>
             <a:fld id="{4509A250-FF31-4206-8172-F9D3106AACB1}" type="datetimeFigureOut">
               <a:rPr lang="en-US" dirty="0"/>
-              <a:t>5/10/2018</a:t>
+              <a:t>5/13/2018</a:t>
             </a:fld>
             <a:endParaRPr lang="en-US" dirty="0"/>
           </a:p>
@@ -4795,7 +4795,7 @@
           <a:p>
             <a:fld id="{4509A250-FF31-4206-8172-F9D3106AACB1}" type="datetimeFigureOut">
               <a:rPr lang="en-US" dirty="0"/>
-              <a:t>5/10/2018</a:t>
+              <a:t>5/13/2018</a:t>
             </a:fld>
             <a:endParaRPr lang="en-US" dirty="0"/>
           </a:p>
@@ -5065,7 +5065,7 @@
           <a:p>
             <a:fld id="{4509A250-FF31-4206-8172-F9D3106AACB1}" type="datetimeFigureOut">
               <a:rPr lang="en-US" dirty="0"/>
-              <a:t>5/10/2018</a:t>
+              <a:t>5/13/2018</a:t>
             </a:fld>
             <a:endParaRPr lang="en-US" dirty="0"/>
           </a:p>
@@ -5489,7 +5489,7 @@
           <a:p>
             <a:fld id="{4AAD347D-5ACD-4C99-B74B-A9C85AD731AF}" type="datetimeFigureOut">
               <a:rPr lang="en-US" dirty="0"/>
-              <a:t>5/10/2018</a:t>
+              <a:t>5/13/2018</a:t>
             </a:fld>
             <a:endParaRPr lang="en-US" dirty="0"/>
           </a:p>
@@ -6276,10 +6276,10 @@
       </p:sp>
       <p:pic>
         <p:nvPicPr>
-          <p:cNvPr id="11" name="Inhaltsplatzhalter 10">
+          <p:cNvPr id="6" name="Inhaltsplatzhalter 5">
             <a:extLst>
               <a:ext uri="{FF2B5EF4-FFF2-40B4-BE49-F238E27FC236}">
-                <a16:creationId xmlns:a16="http://schemas.microsoft.com/office/drawing/2014/main" id="{590D4940-9C85-4D1C-BA2C-8BD18689616B}"/>
+                <a16:creationId xmlns:a16="http://schemas.microsoft.com/office/drawing/2014/main" id="{B89B4DEA-E70F-4FCD-8D40-9A51D9E0C1AC}"/>
               </a:ext>
             </a:extLst>
           </p:cNvPr>
@@ -6298,8 +6298,8 @@
         </p:blipFill>
         <p:spPr>
           <a:xfrm>
-            <a:off x="2380117" y="1318888"/>
-            <a:ext cx="7431765" cy="5161559"/>
+            <a:off x="2578648" y="1356017"/>
+            <a:ext cx="6992072" cy="4892383"/>
           </a:xfrm>
         </p:spPr>
       </p:pic>

</xml_diff>